<commit_message>
figures placed in manuscript
</commit_message>
<xml_diff>
--- a/paper/figures/sanger_sequencing_supp/sanger_sequencing_supp.pptx
+++ b/paper/figures/sanger_sequencing_supp/sanger_sequencing_supp.pptx
@@ -7,7 +7,7 @@
   <p:sldIdLst>
     <p:sldId id="257" r:id="rId2"/>
   </p:sldIdLst>
-  <p:sldSz cx="6858000" cy="8001000"/>
+  <p:sldSz cx="6858000" cy="6400800"/>
   <p:notesSz cx="6858000" cy="9144000"/>
   <p:defaultTextStyle>
     <a:defPPr>
@@ -136,8 +136,8 @@
         </p:nvSpPr>
         <p:spPr>
           <a:xfrm>
-            <a:off x="514350" y="2485497"/>
-            <a:ext cx="5829300" cy="1715029"/>
+            <a:off x="514350" y="1988398"/>
+            <a:ext cx="5829300" cy="1372023"/>
           </a:xfrm>
         </p:spPr>
         <p:txBody>
@@ -164,8 +164,8 @@
         </p:nvSpPr>
         <p:spPr>
           <a:xfrm>
-            <a:off x="1028700" y="4533900"/>
-            <a:ext cx="4800600" cy="2044700"/>
+            <a:off x="1028700" y="3627120"/>
+            <a:ext cx="4800600" cy="1635760"/>
           </a:xfrm>
         </p:spPr>
         <p:txBody>
@@ -288,7 +288,7 @@
           <a:p>
             <a:fld id="{B1E60CEC-8CC6-8B48-9CD4-E19D93CC4CEE}" type="datetimeFigureOut">
               <a:rPr lang="en-US" smtClean="0"/>
-              <a:t>7/24/17</a:t>
+              <a:t>10/31/17</a:t>
             </a:fld>
             <a:endParaRPr lang="en-US"/>
           </a:p>
@@ -458,7 +458,7 @@
           <a:p>
             <a:fld id="{B1E60CEC-8CC6-8B48-9CD4-E19D93CC4CEE}" type="datetimeFigureOut">
               <a:rPr lang="en-US" smtClean="0"/>
-              <a:t>7/24/17</a:t>
+              <a:t>10/31/17</a:t>
             </a:fld>
             <a:endParaRPr lang="en-US"/>
           </a:p>
@@ -548,8 +548,8 @@
         </p:nvSpPr>
         <p:spPr>
           <a:xfrm>
-            <a:off x="3729037" y="374121"/>
-            <a:ext cx="1157288" cy="7963958"/>
+            <a:off x="3729037" y="299297"/>
+            <a:ext cx="1157288" cy="6371166"/>
           </a:xfrm>
         </p:spPr>
         <p:txBody>
@@ -576,8 +576,8 @@
         </p:nvSpPr>
         <p:spPr>
           <a:xfrm>
-            <a:off x="257175" y="374121"/>
-            <a:ext cx="3357563" cy="7963958"/>
+            <a:off x="257176" y="299297"/>
+            <a:ext cx="3357563" cy="6371166"/>
           </a:xfrm>
         </p:spPr>
         <p:txBody>
@@ -638,7 +638,7 @@
           <a:p>
             <a:fld id="{B1E60CEC-8CC6-8B48-9CD4-E19D93CC4CEE}" type="datetimeFigureOut">
               <a:rPr lang="en-US" smtClean="0"/>
-              <a:t>7/24/17</a:t>
+              <a:t>10/31/17</a:t>
             </a:fld>
             <a:endParaRPr lang="en-US"/>
           </a:p>
@@ -808,7 +808,7 @@
           <a:p>
             <a:fld id="{B1E60CEC-8CC6-8B48-9CD4-E19D93CC4CEE}" type="datetimeFigureOut">
               <a:rPr lang="en-US" smtClean="0"/>
-              <a:t>7/24/17</a:t>
+              <a:t>10/31/17</a:t>
             </a:fld>
             <a:endParaRPr lang="en-US"/>
           </a:p>
@@ -898,8 +898,8 @@
         </p:nvSpPr>
         <p:spPr>
           <a:xfrm>
-            <a:off x="541735" y="5141384"/>
-            <a:ext cx="5829300" cy="1589088"/>
+            <a:off x="541735" y="4113107"/>
+            <a:ext cx="5829300" cy="1271270"/>
           </a:xfrm>
         </p:spPr>
         <p:txBody>
@@ -930,8 +930,8 @@
         </p:nvSpPr>
         <p:spPr>
           <a:xfrm>
-            <a:off x="541735" y="3391166"/>
-            <a:ext cx="5829300" cy="1750218"/>
+            <a:off x="541735" y="2712933"/>
+            <a:ext cx="5829300" cy="1400174"/>
           </a:xfrm>
         </p:spPr>
         <p:txBody>
@@ -1054,7 +1054,7 @@
           <a:p>
             <a:fld id="{B1E60CEC-8CC6-8B48-9CD4-E19D93CC4CEE}" type="datetimeFigureOut">
               <a:rPr lang="en-US" smtClean="0"/>
-              <a:t>7/24/17</a:t>
+              <a:t>10/31/17</a:t>
             </a:fld>
             <a:endParaRPr lang="en-US"/>
           </a:p>
@@ -1167,8 +1167,8 @@
         </p:nvSpPr>
         <p:spPr>
           <a:xfrm>
-            <a:off x="257175" y="2178051"/>
-            <a:ext cx="2257425" cy="6160029"/>
+            <a:off x="257176" y="1742441"/>
+            <a:ext cx="2257425" cy="4928023"/>
           </a:xfrm>
         </p:spPr>
         <p:txBody>
@@ -1252,8 +1252,8 @@
         </p:nvSpPr>
         <p:spPr>
           <a:xfrm>
-            <a:off x="2628900" y="2178051"/>
-            <a:ext cx="2257425" cy="6160029"/>
+            <a:off x="2628901" y="1742441"/>
+            <a:ext cx="2257425" cy="4928023"/>
           </a:xfrm>
         </p:spPr>
         <p:txBody>
@@ -1342,7 +1342,7 @@
           <a:p>
             <a:fld id="{B1E60CEC-8CC6-8B48-9CD4-E19D93CC4CEE}" type="datetimeFigureOut">
               <a:rPr lang="en-US" smtClean="0"/>
-              <a:t>7/24/17</a:t>
+              <a:t>10/31/17</a:t>
             </a:fld>
             <a:endParaRPr lang="en-US"/>
           </a:p>
@@ -1432,8 +1432,8 @@
         </p:nvSpPr>
         <p:spPr>
           <a:xfrm>
-            <a:off x="342900" y="320411"/>
-            <a:ext cx="6172200" cy="1333500"/>
+            <a:off x="342900" y="256329"/>
+            <a:ext cx="6172200" cy="1066800"/>
           </a:xfrm>
         </p:spPr>
         <p:txBody>
@@ -1464,8 +1464,8 @@
         </p:nvSpPr>
         <p:spPr>
           <a:xfrm>
-            <a:off x="342900" y="1790965"/>
-            <a:ext cx="3030141" cy="746389"/>
+            <a:off x="342900" y="1432773"/>
+            <a:ext cx="3030141" cy="597111"/>
           </a:xfrm>
         </p:spPr>
         <p:txBody>
@@ -1529,8 +1529,8 @@
         </p:nvSpPr>
         <p:spPr>
           <a:xfrm>
-            <a:off x="342900" y="2537354"/>
-            <a:ext cx="3030141" cy="4609836"/>
+            <a:off x="342900" y="2029883"/>
+            <a:ext cx="3030141" cy="3687869"/>
           </a:xfrm>
         </p:spPr>
         <p:txBody>
@@ -1614,8 +1614,8 @@
         </p:nvSpPr>
         <p:spPr>
           <a:xfrm>
-            <a:off x="3483769" y="1790965"/>
-            <a:ext cx="3031331" cy="746389"/>
+            <a:off x="3483770" y="1432773"/>
+            <a:ext cx="3031331" cy="597111"/>
           </a:xfrm>
         </p:spPr>
         <p:txBody>
@@ -1679,8 +1679,8 @@
         </p:nvSpPr>
         <p:spPr>
           <a:xfrm>
-            <a:off x="3483769" y="2537354"/>
-            <a:ext cx="3031331" cy="4609836"/>
+            <a:off x="3483770" y="2029883"/>
+            <a:ext cx="3031331" cy="3687869"/>
           </a:xfrm>
         </p:spPr>
         <p:txBody>
@@ -1769,7 +1769,7 @@
           <a:p>
             <a:fld id="{B1E60CEC-8CC6-8B48-9CD4-E19D93CC4CEE}" type="datetimeFigureOut">
               <a:rPr lang="en-US" smtClean="0"/>
-              <a:t>7/24/17</a:t>
+              <a:t>10/31/17</a:t>
             </a:fld>
             <a:endParaRPr lang="en-US"/>
           </a:p>
@@ -1887,7 +1887,7 @@
           <a:p>
             <a:fld id="{B1E60CEC-8CC6-8B48-9CD4-E19D93CC4CEE}" type="datetimeFigureOut">
               <a:rPr lang="en-US" smtClean="0"/>
-              <a:t>7/24/17</a:t>
+              <a:t>10/31/17</a:t>
             </a:fld>
             <a:endParaRPr lang="en-US"/>
           </a:p>
@@ -1982,7 +1982,7 @@
           <a:p>
             <a:fld id="{B1E60CEC-8CC6-8B48-9CD4-E19D93CC4CEE}" type="datetimeFigureOut">
               <a:rPr lang="en-US" smtClean="0"/>
-              <a:t>7/24/17</a:t>
+              <a:t>10/31/17</a:t>
             </a:fld>
             <a:endParaRPr lang="en-US"/>
           </a:p>
@@ -2072,8 +2072,8 @@
         </p:nvSpPr>
         <p:spPr>
           <a:xfrm>
-            <a:off x="342900" y="318558"/>
-            <a:ext cx="2256235" cy="1355725"/>
+            <a:off x="342901" y="254847"/>
+            <a:ext cx="2256235" cy="1084580"/>
           </a:xfrm>
         </p:spPr>
         <p:txBody>
@@ -2104,8 +2104,8 @@
         </p:nvSpPr>
         <p:spPr>
           <a:xfrm>
-            <a:off x="2681287" y="318559"/>
-            <a:ext cx="3833813" cy="6828632"/>
+            <a:off x="2681288" y="254847"/>
+            <a:ext cx="3833813" cy="5462906"/>
           </a:xfrm>
         </p:spPr>
         <p:txBody>
@@ -2189,8 +2189,8 @@
         </p:nvSpPr>
         <p:spPr>
           <a:xfrm>
-            <a:off x="342900" y="1674284"/>
-            <a:ext cx="2256235" cy="5472907"/>
+            <a:off x="342901" y="1339427"/>
+            <a:ext cx="2256235" cy="4378326"/>
           </a:xfrm>
         </p:spPr>
         <p:txBody>
@@ -2259,7 +2259,7 @@
           <a:p>
             <a:fld id="{B1E60CEC-8CC6-8B48-9CD4-E19D93CC4CEE}" type="datetimeFigureOut">
               <a:rPr lang="en-US" smtClean="0"/>
-              <a:t>7/24/17</a:t>
+              <a:t>10/31/17</a:t>
             </a:fld>
             <a:endParaRPr lang="en-US"/>
           </a:p>
@@ -2349,8 +2349,8 @@
         </p:nvSpPr>
         <p:spPr>
           <a:xfrm>
-            <a:off x="1344216" y="5600700"/>
-            <a:ext cx="4114800" cy="661194"/>
+            <a:off x="1344216" y="4480560"/>
+            <a:ext cx="4114800" cy="528955"/>
           </a:xfrm>
         </p:spPr>
         <p:txBody>
@@ -2381,8 +2381,8 @@
         </p:nvSpPr>
         <p:spPr>
           <a:xfrm>
-            <a:off x="1344216" y="714904"/>
-            <a:ext cx="4114800" cy="4800600"/>
+            <a:off x="1344216" y="571923"/>
+            <a:ext cx="4114800" cy="3840480"/>
           </a:xfrm>
         </p:spPr>
         <p:txBody>
@@ -2442,8 +2442,8 @@
         </p:nvSpPr>
         <p:spPr>
           <a:xfrm>
-            <a:off x="1344216" y="6261894"/>
-            <a:ext cx="4114800" cy="939006"/>
+            <a:off x="1344216" y="5009515"/>
+            <a:ext cx="4114800" cy="751205"/>
           </a:xfrm>
         </p:spPr>
         <p:txBody>
@@ -2512,7 +2512,7 @@
           <a:p>
             <a:fld id="{B1E60CEC-8CC6-8B48-9CD4-E19D93CC4CEE}" type="datetimeFigureOut">
               <a:rPr lang="en-US" smtClean="0"/>
-              <a:t>7/24/17</a:t>
+              <a:t>10/31/17</a:t>
             </a:fld>
             <a:endParaRPr lang="en-US"/>
           </a:p>
@@ -2607,8 +2607,8 @@
         </p:nvSpPr>
         <p:spPr>
           <a:xfrm>
-            <a:off x="342900" y="320411"/>
-            <a:ext cx="6172200" cy="1333500"/>
+            <a:off x="342900" y="256329"/>
+            <a:ext cx="6172200" cy="1066800"/>
           </a:xfrm>
           <a:prstGeom prst="rect">
             <a:avLst/>
@@ -2640,8 +2640,8 @@
         </p:nvSpPr>
         <p:spPr>
           <a:xfrm>
-            <a:off x="342900" y="1866901"/>
-            <a:ext cx="6172200" cy="5280290"/>
+            <a:off x="342900" y="1493521"/>
+            <a:ext cx="6172200" cy="4224232"/>
           </a:xfrm>
           <a:prstGeom prst="rect">
             <a:avLst/>
@@ -2702,8 +2702,8 @@
         </p:nvSpPr>
         <p:spPr>
           <a:xfrm>
-            <a:off x="342900" y="7415742"/>
-            <a:ext cx="1600200" cy="425979"/>
+            <a:off x="342900" y="5932594"/>
+            <a:ext cx="1600200" cy="340783"/>
           </a:xfrm>
           <a:prstGeom prst="rect">
             <a:avLst/>
@@ -2725,7 +2725,7 @@
           <a:p>
             <a:fld id="{B1E60CEC-8CC6-8B48-9CD4-E19D93CC4CEE}" type="datetimeFigureOut">
               <a:rPr lang="en-US" smtClean="0"/>
-              <a:t>7/24/17</a:t>
+              <a:t>10/31/17</a:t>
             </a:fld>
             <a:endParaRPr lang="en-US"/>
           </a:p>
@@ -2743,8 +2743,8 @@
         </p:nvSpPr>
         <p:spPr>
           <a:xfrm>
-            <a:off x="2343150" y="7415742"/>
-            <a:ext cx="2171700" cy="425979"/>
+            <a:off x="2343150" y="5932594"/>
+            <a:ext cx="2171700" cy="340783"/>
           </a:xfrm>
           <a:prstGeom prst="rect">
             <a:avLst/>
@@ -2780,8 +2780,8 @@
         </p:nvSpPr>
         <p:spPr>
           <a:xfrm>
-            <a:off x="4914900" y="7415742"/>
-            <a:ext cx="1600200" cy="425979"/>
+            <a:off x="4914900" y="5932594"/>
+            <a:ext cx="1600200" cy="340783"/>
           </a:xfrm>
           <a:prstGeom prst="rect">
             <a:avLst/>
@@ -3100,334 +3100,321 @@
           <a:chExt cx="0" cy="0"/>
         </a:xfrm>
       </p:grpSpPr>
-      <p:pic>
-        <p:nvPicPr>
-          <p:cNvPr id="4" name="Picture 3"/>
-          <p:cNvPicPr>
-            <a:picLocks noChangeAspect="1"/>
-          </p:cNvPicPr>
+      <p:grpSp>
+        <p:nvGrpSpPr>
+          <p:cNvPr id="13" name="Group 12"/>
+          <p:cNvGrpSpPr/>
           <p:nvPr/>
-        </p:nvPicPr>
-        <p:blipFill>
-          <a:blip r:embed="rId2"/>
-          <a:stretch>
-            <a:fillRect/>
-          </a:stretch>
-        </p:blipFill>
-        <p:spPr>
+        </p:nvGrpSpPr>
+        <p:grpSpPr>
           <a:xfrm>
-            <a:off x="3406675" y="291658"/>
-            <a:ext cx="3397491" cy="1607849"/>
+            <a:off x="6520" y="9671"/>
+            <a:ext cx="6797646" cy="6274904"/>
+            <a:chOff x="6520" y="9671"/>
+            <a:chExt cx="6797646" cy="6274904"/>
           </a:xfrm>
-          <a:prstGeom prst="rect">
-            <a:avLst/>
-          </a:prstGeom>
-        </p:spPr>
-      </p:pic>
-      <p:pic>
-        <p:nvPicPr>
-          <p:cNvPr id="2" name="Picture 1"/>
-          <p:cNvPicPr>
-            <a:picLocks noChangeAspect="1"/>
-          </p:cNvPicPr>
-          <p:nvPr/>
-        </p:nvPicPr>
-        <p:blipFill>
-          <a:blip r:embed="rId3"/>
-          <a:stretch>
-            <a:fillRect/>
-          </a:stretch>
-        </p:blipFill>
-        <p:spPr>
-          <a:xfrm>
-            <a:off x="229599" y="237388"/>
-            <a:ext cx="2870756" cy="1799992"/>
-          </a:xfrm>
-          <a:prstGeom prst="rect">
-            <a:avLst/>
-          </a:prstGeom>
-        </p:spPr>
-      </p:pic>
-      <p:sp>
-        <p:nvSpPr>
-          <p:cNvPr id="994" name="TextBox 993"/>
-          <p:cNvSpPr txBox="1"/>
-          <p:nvPr/>
-        </p:nvSpPr>
-        <p:spPr>
-          <a:xfrm>
-            <a:off x="6520" y="11902"/>
-            <a:ext cx="461442" cy="397971"/>
-          </a:xfrm>
-          <a:prstGeom prst="rect">
-            <a:avLst/>
-          </a:prstGeom>
-          <a:noFill/>
-        </p:spPr>
-        <p:txBody>
-          <a:bodyPr wrap="none" rtlCol="0">
-            <a:spAutoFit/>
-          </a:bodyPr>
-          <a:lstStyle/>
-          <a:p>
-            <a:r>
-              <a:rPr lang="en-US" b="1" dirty="0">
+        </p:grpSpPr>
+        <p:pic>
+          <p:nvPicPr>
+            <p:cNvPr id="14" name="Picture 13"/>
+            <p:cNvPicPr>
+              <a:picLocks noChangeAspect="1"/>
+            </p:cNvPicPr>
+            <p:nvPr/>
+          </p:nvPicPr>
+          <p:blipFill>
+            <a:blip r:embed="rId2"/>
+            <a:stretch>
+              <a:fillRect/>
+            </a:stretch>
+          </p:blipFill>
+          <p:spPr>
+            <a:xfrm>
+              <a:off x="3406675" y="291658"/>
+              <a:ext cx="3397491" cy="1607849"/>
+            </a:xfrm>
+            <a:prstGeom prst="rect">
+              <a:avLst/>
+            </a:prstGeom>
+          </p:spPr>
+        </p:pic>
+        <p:pic>
+          <p:nvPicPr>
+            <p:cNvPr id="15" name="Picture 14"/>
+            <p:cNvPicPr>
+              <a:picLocks noChangeAspect="1"/>
+            </p:cNvPicPr>
+            <p:nvPr/>
+          </p:nvPicPr>
+          <p:blipFill>
+            <a:blip r:embed="rId3"/>
+            <a:stretch>
+              <a:fillRect/>
+            </a:stretch>
+          </p:blipFill>
+          <p:spPr>
+            <a:xfrm>
+              <a:off x="229599" y="237388"/>
+              <a:ext cx="2870756" cy="1799992"/>
+            </a:xfrm>
+            <a:prstGeom prst="rect">
+              <a:avLst/>
+            </a:prstGeom>
+          </p:spPr>
+        </p:pic>
+        <p:sp>
+          <p:nvSpPr>
+            <p:cNvPr id="16" name="TextBox 15"/>
+            <p:cNvSpPr txBox="1"/>
+            <p:nvPr/>
+          </p:nvSpPr>
+          <p:spPr>
+            <a:xfrm>
+              <a:off x="6520" y="11902"/>
+              <a:ext cx="351378" cy="369332"/>
+            </a:xfrm>
+            <a:prstGeom prst="rect">
+              <a:avLst/>
+            </a:prstGeom>
+            <a:noFill/>
+          </p:spPr>
+          <p:txBody>
+            <a:bodyPr wrap="none" rtlCol="0">
+              <a:spAutoFit/>
+            </a:bodyPr>
+            <a:lstStyle/>
+            <a:p>
+              <a:r>
+                <a:rPr lang="en-US" b="1" dirty="0" smtClean="0">
+                  <a:latin typeface="Arial"/>
+                  <a:cs typeface="Arial"/>
+                </a:rPr>
+                <a:t>A</a:t>
+              </a:r>
+              <a:endParaRPr lang="en-US" b="1" dirty="0">
                 <a:latin typeface="Arial"/>
                 <a:cs typeface="Arial"/>
-              </a:rPr>
-              <a:t>A</a:t>
-            </a:r>
-            <a:r>
-              <a:rPr lang="en-US" b="1" dirty="0" smtClean="0">
+              </a:endParaRPr>
+            </a:p>
+          </p:txBody>
+        </p:sp>
+        <p:sp>
+          <p:nvSpPr>
+            <p:cNvPr id="17" name="TextBox 16"/>
+            <p:cNvSpPr txBox="1"/>
+            <p:nvPr/>
+          </p:nvSpPr>
+          <p:spPr>
+            <a:xfrm>
+              <a:off x="3167843" y="9671"/>
+              <a:ext cx="351366" cy="369332"/>
+            </a:xfrm>
+            <a:prstGeom prst="rect">
+              <a:avLst/>
+            </a:prstGeom>
+            <a:noFill/>
+          </p:spPr>
+          <p:txBody>
+            <a:bodyPr wrap="none" rtlCol="0">
+              <a:spAutoFit/>
+            </a:bodyPr>
+            <a:lstStyle/>
+            <a:p>
+              <a:r>
+                <a:rPr lang="en-US" b="1" dirty="0" smtClean="0">
+                  <a:latin typeface="Arial"/>
+                  <a:cs typeface="Arial"/>
+                </a:rPr>
+                <a:t>D</a:t>
+              </a:r>
+              <a:endParaRPr lang="en-US" b="1" dirty="0">
                 <a:latin typeface="Arial"/>
                 <a:cs typeface="Arial"/>
-              </a:rPr>
-              <a:t>)</a:t>
-            </a:r>
-            <a:endParaRPr lang="en-US" b="1" dirty="0">
-              <a:latin typeface="Arial"/>
-              <a:cs typeface="Arial"/>
-            </a:endParaRPr>
-          </a:p>
-        </p:txBody>
-      </p:sp>
-      <p:sp>
-        <p:nvSpPr>
-          <p:cNvPr id="995" name="TextBox 994"/>
-          <p:cNvSpPr txBox="1"/>
-          <p:nvPr/>
-        </p:nvSpPr>
-        <p:spPr>
-          <a:xfrm>
-            <a:off x="3167843" y="9671"/>
-            <a:ext cx="428235" cy="369332"/>
-          </a:xfrm>
-          <a:prstGeom prst="rect">
-            <a:avLst/>
-          </a:prstGeom>
-          <a:noFill/>
-        </p:spPr>
-        <p:txBody>
-          <a:bodyPr wrap="none" rtlCol="0">
-            <a:spAutoFit/>
-          </a:bodyPr>
-          <a:lstStyle/>
-          <a:p>
-            <a:r>
-              <a:rPr lang="en-US" b="1" dirty="0">
+              </a:endParaRPr>
+            </a:p>
+          </p:txBody>
+        </p:sp>
+        <p:sp>
+          <p:nvSpPr>
+            <p:cNvPr id="18" name="TextBox 17"/>
+            <p:cNvSpPr txBox="1"/>
+            <p:nvPr/>
+          </p:nvSpPr>
+          <p:spPr>
+            <a:xfrm>
+              <a:off x="6520" y="2069942"/>
+              <a:ext cx="351366" cy="369332"/>
+            </a:xfrm>
+            <a:prstGeom prst="rect">
+              <a:avLst/>
+            </a:prstGeom>
+            <a:noFill/>
+          </p:spPr>
+          <p:txBody>
+            <a:bodyPr wrap="none" rtlCol="0">
+              <a:spAutoFit/>
+            </a:bodyPr>
+            <a:lstStyle/>
+            <a:p>
+              <a:r>
+                <a:rPr lang="en-US" b="1" dirty="0" smtClean="0">
+                  <a:latin typeface="Arial"/>
+                  <a:cs typeface="Arial"/>
+                </a:rPr>
+                <a:t>B</a:t>
+              </a:r>
+              <a:endParaRPr lang="en-US" b="1" dirty="0">
                 <a:latin typeface="Arial"/>
                 <a:cs typeface="Arial"/>
-              </a:rPr>
-              <a:t>D</a:t>
-            </a:r>
-            <a:r>
-              <a:rPr lang="en-US" b="1" dirty="0" smtClean="0">
+              </a:endParaRPr>
+            </a:p>
+          </p:txBody>
+        </p:sp>
+        <p:sp>
+          <p:nvSpPr>
+            <p:cNvPr id="19" name="TextBox 18"/>
+            <p:cNvSpPr txBox="1"/>
+            <p:nvPr/>
+          </p:nvSpPr>
+          <p:spPr>
+            <a:xfrm>
+              <a:off x="3167843" y="2067711"/>
+              <a:ext cx="338629" cy="369332"/>
+            </a:xfrm>
+            <a:prstGeom prst="rect">
+              <a:avLst/>
+            </a:prstGeom>
+            <a:noFill/>
+          </p:spPr>
+          <p:txBody>
+            <a:bodyPr wrap="none" rtlCol="0">
+              <a:spAutoFit/>
+            </a:bodyPr>
+            <a:lstStyle/>
+            <a:p>
+              <a:r>
+                <a:rPr lang="en-US" b="1" dirty="0" smtClean="0">
+                  <a:latin typeface="Arial"/>
+                  <a:cs typeface="Arial"/>
+                </a:rPr>
+                <a:t>E</a:t>
+              </a:r>
+              <a:endParaRPr lang="en-US" b="1" dirty="0">
                 <a:latin typeface="Arial"/>
                 <a:cs typeface="Arial"/>
-              </a:rPr>
-              <a:t>)</a:t>
-            </a:r>
-            <a:endParaRPr lang="en-US" b="1" dirty="0">
-              <a:latin typeface="Arial"/>
-              <a:cs typeface="Arial"/>
-            </a:endParaRPr>
-          </a:p>
-        </p:txBody>
-      </p:sp>
-      <p:sp>
-        <p:nvSpPr>
-          <p:cNvPr id="996" name="TextBox 995"/>
-          <p:cNvSpPr txBox="1"/>
-          <p:nvPr/>
-        </p:nvSpPr>
-        <p:spPr>
-          <a:xfrm>
-            <a:off x="6520" y="2069942"/>
-            <a:ext cx="428235" cy="369332"/>
-          </a:xfrm>
-          <a:prstGeom prst="rect">
-            <a:avLst/>
-          </a:prstGeom>
-          <a:noFill/>
-        </p:spPr>
-        <p:txBody>
-          <a:bodyPr wrap="none" rtlCol="0">
-            <a:spAutoFit/>
-          </a:bodyPr>
-          <a:lstStyle/>
-          <a:p>
-            <a:r>
-              <a:rPr lang="en-US" b="1" dirty="0">
+              </a:endParaRPr>
+            </a:p>
+          </p:txBody>
+        </p:sp>
+        <p:sp>
+          <p:nvSpPr>
+            <p:cNvPr id="20" name="TextBox 19"/>
+            <p:cNvSpPr txBox="1"/>
+            <p:nvPr/>
+          </p:nvSpPr>
+          <p:spPr>
+            <a:xfrm>
+              <a:off x="9458" y="4233827"/>
+              <a:ext cx="351366" cy="369332"/>
+            </a:xfrm>
+            <a:prstGeom prst="rect">
+              <a:avLst/>
+            </a:prstGeom>
+            <a:noFill/>
+          </p:spPr>
+          <p:txBody>
+            <a:bodyPr wrap="none" rtlCol="0">
+              <a:spAutoFit/>
+            </a:bodyPr>
+            <a:lstStyle/>
+            <a:p>
+              <a:r>
+                <a:rPr lang="en-US" b="1" dirty="0" smtClean="0">
+                  <a:latin typeface="Arial"/>
+                  <a:cs typeface="Arial"/>
+                </a:rPr>
+                <a:t>C</a:t>
+              </a:r>
+              <a:endParaRPr lang="en-US" b="1" dirty="0">
                 <a:latin typeface="Arial"/>
                 <a:cs typeface="Arial"/>
-              </a:rPr>
-              <a:t>B</a:t>
-            </a:r>
-            <a:r>
-              <a:rPr lang="en-US" b="1" dirty="0" smtClean="0">
-                <a:latin typeface="Arial"/>
-                <a:cs typeface="Arial"/>
-              </a:rPr>
-              <a:t>)</a:t>
-            </a:r>
-            <a:endParaRPr lang="en-US" b="1" dirty="0">
-              <a:latin typeface="Arial"/>
-              <a:cs typeface="Arial"/>
-            </a:endParaRPr>
-          </a:p>
-        </p:txBody>
-      </p:sp>
-      <p:sp>
-        <p:nvSpPr>
-          <p:cNvPr id="997" name="TextBox 996"/>
-          <p:cNvSpPr txBox="1"/>
-          <p:nvPr/>
-        </p:nvSpPr>
-        <p:spPr>
-          <a:xfrm>
-            <a:off x="3167843" y="2067711"/>
-            <a:ext cx="415498" cy="369332"/>
-          </a:xfrm>
-          <a:prstGeom prst="rect">
-            <a:avLst/>
-          </a:prstGeom>
-          <a:noFill/>
-        </p:spPr>
-        <p:txBody>
-          <a:bodyPr wrap="none" rtlCol="0">
-            <a:spAutoFit/>
-          </a:bodyPr>
-          <a:lstStyle/>
-          <a:p>
-            <a:r>
-              <a:rPr lang="en-US" b="1" dirty="0" smtClean="0">
-                <a:latin typeface="Arial"/>
-                <a:cs typeface="Arial"/>
-              </a:rPr>
-              <a:t>E)</a:t>
-            </a:r>
-            <a:endParaRPr lang="en-US" b="1" dirty="0">
-              <a:latin typeface="Arial"/>
-              <a:cs typeface="Arial"/>
-            </a:endParaRPr>
-          </a:p>
-        </p:txBody>
-      </p:sp>
-      <p:sp>
-        <p:nvSpPr>
-          <p:cNvPr id="1061" name="TextBox 1060"/>
-          <p:cNvSpPr txBox="1"/>
-          <p:nvPr/>
-        </p:nvSpPr>
-        <p:spPr>
-          <a:xfrm>
-            <a:off x="9458" y="4233827"/>
-            <a:ext cx="428235" cy="369332"/>
-          </a:xfrm>
-          <a:prstGeom prst="rect">
-            <a:avLst/>
-          </a:prstGeom>
-          <a:noFill/>
-        </p:spPr>
-        <p:txBody>
-          <a:bodyPr wrap="none" rtlCol="0">
-            <a:spAutoFit/>
-          </a:bodyPr>
-          <a:lstStyle/>
-          <a:p>
-            <a:r>
-              <a:rPr lang="en-US" b="1" dirty="0">
-                <a:latin typeface="Arial"/>
-                <a:cs typeface="Arial"/>
-              </a:rPr>
-              <a:t>C</a:t>
-            </a:r>
-            <a:r>
-              <a:rPr lang="en-US" b="1" dirty="0" smtClean="0">
-                <a:latin typeface="Arial"/>
-                <a:cs typeface="Arial"/>
-              </a:rPr>
-              <a:t>)</a:t>
-            </a:r>
-            <a:endParaRPr lang="en-US" b="1" dirty="0">
-              <a:latin typeface="Arial"/>
-              <a:cs typeface="Arial"/>
-            </a:endParaRPr>
-          </a:p>
-        </p:txBody>
-      </p:sp>
-      <p:pic>
-        <p:nvPicPr>
-          <p:cNvPr id="5" name="Picture 4"/>
-          <p:cNvPicPr>
-            <a:picLocks noChangeAspect="1"/>
-          </p:cNvPicPr>
-          <p:nvPr/>
-        </p:nvPicPr>
-        <p:blipFill>
-          <a:blip r:embed="rId4"/>
-          <a:stretch>
-            <a:fillRect/>
-          </a:stretch>
-        </p:blipFill>
-        <p:spPr>
-          <a:xfrm>
-            <a:off x="154361" y="4566961"/>
-            <a:ext cx="2905373" cy="1717614"/>
-          </a:xfrm>
-          <a:prstGeom prst="rect">
-            <a:avLst/>
-          </a:prstGeom>
-        </p:spPr>
-      </p:pic>
-      <p:pic>
-        <p:nvPicPr>
-          <p:cNvPr id="6" name="Picture 5"/>
-          <p:cNvPicPr>
-            <a:picLocks noChangeAspect="1"/>
-          </p:cNvPicPr>
-          <p:nvPr/>
-        </p:nvPicPr>
-        <p:blipFill>
-          <a:blip r:embed="rId5"/>
-          <a:stretch>
-            <a:fillRect/>
-          </a:stretch>
-        </p:blipFill>
-        <p:spPr>
-          <a:xfrm>
-            <a:off x="3406675" y="2404481"/>
-            <a:ext cx="3303096" cy="1579060"/>
-          </a:xfrm>
-          <a:prstGeom prst="rect">
-            <a:avLst/>
-          </a:prstGeom>
-        </p:spPr>
-      </p:pic>
-      <p:pic>
-        <p:nvPicPr>
-          <p:cNvPr id="7" name="Picture 6"/>
-          <p:cNvPicPr>
-            <a:picLocks noChangeAspect="1"/>
-          </p:cNvPicPr>
-          <p:nvPr/>
-        </p:nvPicPr>
-        <p:blipFill>
-          <a:blip r:embed="rId6"/>
-          <a:stretch>
-            <a:fillRect/>
-          </a:stretch>
-        </p:blipFill>
-        <p:spPr>
-          <a:xfrm>
-            <a:off x="170307" y="2468906"/>
-            <a:ext cx="2930048" cy="1783312"/>
-          </a:xfrm>
-          <a:prstGeom prst="rect">
-            <a:avLst/>
-          </a:prstGeom>
-        </p:spPr>
-      </p:pic>
+              </a:endParaRPr>
+            </a:p>
+          </p:txBody>
+        </p:sp>
+        <p:pic>
+          <p:nvPicPr>
+            <p:cNvPr id="21" name="Picture 20"/>
+            <p:cNvPicPr>
+              <a:picLocks noChangeAspect="1"/>
+            </p:cNvPicPr>
+            <p:nvPr/>
+          </p:nvPicPr>
+          <p:blipFill>
+            <a:blip r:embed="rId4"/>
+            <a:stretch>
+              <a:fillRect/>
+            </a:stretch>
+          </p:blipFill>
+          <p:spPr>
+            <a:xfrm>
+              <a:off x="154361" y="4566961"/>
+              <a:ext cx="2905373" cy="1717614"/>
+            </a:xfrm>
+            <a:prstGeom prst="rect">
+              <a:avLst/>
+            </a:prstGeom>
+          </p:spPr>
+        </p:pic>
+        <p:pic>
+          <p:nvPicPr>
+            <p:cNvPr id="22" name="Picture 21"/>
+            <p:cNvPicPr>
+              <a:picLocks noChangeAspect="1"/>
+            </p:cNvPicPr>
+            <p:nvPr/>
+          </p:nvPicPr>
+          <p:blipFill>
+            <a:blip r:embed="rId5"/>
+            <a:stretch>
+              <a:fillRect/>
+            </a:stretch>
+          </p:blipFill>
+          <p:spPr>
+            <a:xfrm>
+              <a:off x="3406675" y="2404481"/>
+              <a:ext cx="3303096" cy="1579060"/>
+            </a:xfrm>
+            <a:prstGeom prst="rect">
+              <a:avLst/>
+            </a:prstGeom>
+          </p:spPr>
+        </p:pic>
+        <p:pic>
+          <p:nvPicPr>
+            <p:cNvPr id="23" name="Picture 22"/>
+            <p:cNvPicPr>
+              <a:picLocks noChangeAspect="1"/>
+            </p:cNvPicPr>
+            <p:nvPr/>
+          </p:nvPicPr>
+          <p:blipFill>
+            <a:blip r:embed="rId6"/>
+            <a:stretch>
+              <a:fillRect/>
+            </a:stretch>
+          </p:blipFill>
+          <p:spPr>
+            <a:xfrm>
+              <a:off x="170307" y="2468906"/>
+              <a:ext cx="2930048" cy="1783312"/>
+            </a:xfrm>
+            <a:prstGeom prst="rect">
+              <a:avLst/>
+            </a:prstGeom>
+          </p:spPr>
+        </p:pic>
+      </p:grpSp>
     </p:spTree>
     <p:extLst>
       <p:ext uri="{BB962C8B-B14F-4D97-AF65-F5344CB8AC3E}">

</xml_diff>